<commit_message>
slight updates to plot
</commit_message>
<xml_diff>
--- a/RA-L/pictures/pdf/ControlledCorrelation.pptx
+++ b/RA-L/pictures/pdf/ControlledCorrelation.pptx
@@ -3097,21 +3097,22 @@
       </p:grpSpPr>
       <p:pic>
         <p:nvPicPr>
-          <p:cNvPr id="18" name="Picture 17"/>
+          <p:cNvPr id="61" name="Picture 60"/>
           <p:cNvPicPr>
             <a:picLocks noChangeAspect="1"/>
           </p:cNvPicPr>
           <p:nvPr/>
         </p:nvPicPr>
-        <p:blipFill rotWithShape="1">
+        <p:blipFill>
           <a:blip r:embed="rId2"/>
-          <a:srcRect l="11286"/>
-          <a:stretch/>
+          <a:stretch>
+            <a:fillRect/>
+          </a:stretch>
         </p:blipFill>
         <p:spPr>
           <a:xfrm>
-            <a:off x="7093856" y="0"/>
-            <a:ext cx="2253343" cy="2832100"/>
+            <a:off x="6807199" y="2744888"/>
+            <a:ext cx="2540000" cy="2552700"/>
           </a:xfrm>
           <a:prstGeom prst="rect">
             <a:avLst/>
@@ -3120,7 +3121,7 @@
       </p:pic>
       <p:pic>
         <p:nvPicPr>
-          <p:cNvPr id="61" name="Picture 60"/>
+          <p:cNvPr id="3" name="Picture 2"/>
           <p:cNvPicPr>
             <a:picLocks noChangeAspect="1"/>
           </p:cNvPicPr>
@@ -3134,8 +3135,31 @@
         </p:blipFill>
         <p:spPr>
           <a:xfrm>
-            <a:off x="6807199" y="2744888"/>
-            <a:ext cx="2540000" cy="2552700"/>
+            <a:off x="-732756" y="2791996"/>
+            <a:ext cx="10463160" cy="3812005"/>
+          </a:xfrm>
+          <a:prstGeom prst="rect">
+            <a:avLst/>
+          </a:prstGeom>
+        </p:spPr>
+      </p:pic>
+      <p:pic>
+        <p:nvPicPr>
+          <p:cNvPr id="18" name="Picture 17"/>
+          <p:cNvPicPr>
+            <a:picLocks noChangeAspect="1"/>
+          </p:cNvPicPr>
+          <p:nvPr/>
+        </p:nvPicPr>
+        <p:blipFill rotWithShape="1">
+          <a:blip r:embed="rId4"/>
+          <a:srcRect l="11286"/>
+          <a:stretch/>
+        </p:blipFill>
+        <p:spPr>
+          <a:xfrm>
+            <a:off x="7093856" y="0"/>
+            <a:ext cx="2253343" cy="2832100"/>
           </a:xfrm>
           <a:prstGeom prst="rect">
             <a:avLst/>
@@ -3151,7 +3175,7 @@
           <p:nvPr/>
         </p:nvPicPr>
         <p:blipFill rotWithShape="1">
-          <a:blip r:embed="rId4"/>
+          <a:blip r:embed="rId5"/>
           <a:srcRect l="11429"/>
           <a:stretch/>
         </p:blipFill>
@@ -3174,7 +3198,7 @@
           <p:nvPr/>
         </p:nvPicPr>
         <p:blipFill rotWithShape="1">
-          <a:blip r:embed="rId5"/>
+          <a:blip r:embed="rId6"/>
           <a:srcRect l="10526"/>
           <a:stretch/>
         </p:blipFill>
@@ -3197,7 +3221,7 @@
           <p:nvPr/>
         </p:nvPicPr>
         <p:blipFill rotWithShape="1">
-          <a:blip r:embed="rId6"/>
+          <a:blip r:embed="rId7"/>
           <a:srcRect l="11286"/>
           <a:stretch/>
         </p:blipFill>
@@ -3696,305 +3720,236 @@
           </a:p>
         </p:txBody>
       </p:sp>
-      <p:grpSp>
-        <p:nvGrpSpPr>
-          <p:cNvPr id="2" name="Group 1"/>
-          <p:cNvGrpSpPr/>
+      <p:sp>
+        <p:nvSpPr>
+          <p:cNvPr id="25" name="Oval 24"/>
+          <p:cNvSpPr/>
           <p:nvPr/>
-        </p:nvGrpSpPr>
-        <p:grpSpPr>
+        </p:nvSpPr>
+        <p:spPr>
           <a:xfrm>
-            <a:off x="-746124" y="2603500"/>
-            <a:ext cx="10668000" cy="4254499"/>
-            <a:chOff x="-746124" y="2603500"/>
-            <a:chExt cx="10668000" cy="4254499"/>
-          </a:xfrm>
-        </p:grpSpPr>
-        <p:grpSp>
-          <p:nvGrpSpPr>
-            <p:cNvPr id="37" name="Group 36"/>
-            <p:cNvGrpSpPr/>
-            <p:nvPr/>
-          </p:nvGrpSpPr>
-          <p:grpSpPr>
-            <a:xfrm>
-              <a:off x="-746124" y="2603500"/>
-              <a:ext cx="10668000" cy="4254499"/>
-              <a:chOff x="-746124" y="2603500"/>
-              <a:chExt cx="10668000" cy="4254499"/>
-            </a:xfrm>
-          </p:grpSpPr>
-          <p:grpSp>
-            <p:nvGrpSpPr>
-              <p:cNvPr id="26" name="Group 25"/>
-              <p:cNvGrpSpPr/>
-              <p:nvPr/>
-            </p:nvGrpSpPr>
-            <p:grpSpPr>
-              <a:xfrm>
-                <a:off x="-746124" y="2603500"/>
-                <a:ext cx="10668000" cy="4254499"/>
-                <a:chOff x="-451854" y="2918327"/>
-                <a:chExt cx="10103853" cy="3681100"/>
-              </a:xfrm>
-            </p:grpSpPr>
-            <p:pic>
-              <p:nvPicPr>
-                <p:cNvPr id="14" name="Picture 13"/>
-                <p:cNvPicPr>
-                  <a:picLocks noChangeAspect="1"/>
-                </p:cNvPicPr>
-                <p:nvPr/>
-              </p:nvPicPr>
-              <p:blipFill>
-                <a:blip r:embed="rId7"/>
-                <a:stretch>
-                  <a:fillRect/>
-                </a:stretch>
-              </p:blipFill>
-              <p:spPr>
-                <a:xfrm>
-                  <a:off x="-451854" y="2918327"/>
-                  <a:ext cx="10103853" cy="3681100"/>
-                </a:xfrm>
-                <a:prstGeom prst="rect">
-                  <a:avLst/>
-                </a:prstGeom>
-              </p:spPr>
-            </p:pic>
-            <p:sp>
-              <p:nvSpPr>
-                <p:cNvPr id="25" name="Oval 24"/>
-                <p:cNvSpPr/>
-                <p:nvPr/>
-              </p:nvSpPr>
-              <p:spPr>
-                <a:xfrm>
-                  <a:off x="1397025" y="4517563"/>
-                  <a:ext cx="108857" cy="108857"/>
-                </a:xfrm>
-                <a:prstGeom prst="ellipse">
-                  <a:avLst/>
-                </a:prstGeom>
-                <a:solidFill>
-                  <a:srgbClr val="E44B29"/>
-                </a:solidFill>
-                <a:ln>
-                  <a:solidFill>
-                    <a:schemeClr val="tx1"/>
-                  </a:solidFill>
-                </a:ln>
-              </p:spPr>
-              <p:style>
-                <a:lnRef idx="1">
-                  <a:schemeClr val="accent1"/>
-                </a:lnRef>
-                <a:fillRef idx="3">
-                  <a:schemeClr val="accent1"/>
-                </a:fillRef>
-                <a:effectRef idx="2">
-                  <a:schemeClr val="accent1"/>
-                </a:effectRef>
-                <a:fontRef idx="minor">
-                  <a:schemeClr val="lt1"/>
-                </a:fontRef>
-              </p:style>
-              <p:txBody>
-                <a:bodyPr rtlCol="0" anchor="ctr"/>
-                <a:lstStyle/>
-                <a:p>
-                  <a:pPr algn="ctr"/>
-                  <a:endParaRPr lang="en-US"/>
-                </a:p>
-              </p:txBody>
-            </p:sp>
-          </p:grpSp>
-          <p:sp>
-            <p:nvSpPr>
-              <p:cNvPr id="36" name="Rectangle 35"/>
-              <p:cNvSpPr/>
-              <p:nvPr/>
-            </p:nvSpPr>
-            <p:spPr>
-              <a:xfrm rot="18900000">
-                <a:off x="2023604" y="4444880"/>
-                <a:ext cx="114935" cy="120650"/>
-              </a:xfrm>
-              <a:prstGeom prst="rect">
-                <a:avLst/>
-              </a:prstGeom>
-              <a:solidFill>
-                <a:srgbClr val="7DA426"/>
-              </a:solidFill>
-              <a:ln>
-                <a:solidFill>
-                  <a:srgbClr val="000000"/>
-                </a:solidFill>
-              </a:ln>
-            </p:spPr>
-            <p:style>
-              <a:lnRef idx="1">
-                <a:schemeClr val="accent1"/>
-              </a:lnRef>
-              <a:fillRef idx="3">
-                <a:schemeClr val="accent1"/>
-              </a:fillRef>
-              <a:effectRef idx="2">
-                <a:schemeClr val="accent1"/>
-              </a:effectRef>
-              <a:fontRef idx="minor">
-                <a:schemeClr val="lt1"/>
-              </a:fontRef>
-            </p:style>
-            <p:txBody>
-              <a:bodyPr rtlCol="0" anchor="ctr"/>
-              <a:lstStyle/>
-              <a:p>
-                <a:pPr algn="ctr"/>
-                <a:endParaRPr lang="en-US"/>
-              </a:p>
-            </p:txBody>
-          </p:sp>
-          <p:sp>
-            <p:nvSpPr>
-              <p:cNvPr id="34" name="Rectangle 33"/>
-              <p:cNvSpPr/>
-              <p:nvPr/>
-            </p:nvSpPr>
-            <p:spPr>
-              <a:xfrm>
-                <a:off x="3669179" y="4420399"/>
-                <a:ext cx="114935" cy="120650"/>
-              </a:xfrm>
-              <a:prstGeom prst="rect">
-                <a:avLst/>
-              </a:prstGeom>
-              <a:solidFill>
-                <a:srgbClr val="4A69A1"/>
-              </a:solidFill>
-              <a:ln>
-                <a:solidFill>
-                  <a:srgbClr val="000000"/>
-                </a:solidFill>
-              </a:ln>
-            </p:spPr>
-            <p:style>
-              <a:lnRef idx="1">
-                <a:schemeClr val="accent1"/>
-              </a:lnRef>
-              <a:fillRef idx="3">
-                <a:schemeClr val="accent1"/>
-              </a:fillRef>
-              <a:effectRef idx="2">
-                <a:schemeClr val="accent1"/>
-              </a:effectRef>
-              <a:fontRef idx="minor">
-                <a:schemeClr val="lt1"/>
-              </a:fontRef>
-            </p:style>
-            <p:txBody>
-              <a:bodyPr rtlCol="0" anchor="ctr"/>
-              <a:lstStyle/>
-              <a:p>
-                <a:pPr algn="ctr"/>
-                <a:endParaRPr lang="en-US"/>
-              </a:p>
-            </p:txBody>
-          </p:sp>
-          <p:sp>
-            <p:nvSpPr>
-              <p:cNvPr id="35" name="Isosceles Triangle 34"/>
-              <p:cNvSpPr/>
-              <p:nvPr/>
-            </p:nvSpPr>
-            <p:spPr>
-              <a:xfrm>
-                <a:off x="2852237" y="4189787"/>
-                <a:ext cx="114935" cy="139700"/>
-              </a:xfrm>
-              <a:prstGeom prst="triangle">
-                <a:avLst/>
-              </a:prstGeom>
-              <a:solidFill>
-                <a:srgbClr val="CE851C"/>
-              </a:solidFill>
-              <a:ln>
-                <a:solidFill>
-                  <a:srgbClr val="000000"/>
-                </a:solidFill>
-              </a:ln>
-            </p:spPr>
-            <p:style>
-              <a:lnRef idx="1">
-                <a:schemeClr val="accent1"/>
-              </a:lnRef>
-              <a:fillRef idx="3">
-                <a:schemeClr val="accent1"/>
-              </a:fillRef>
-              <a:effectRef idx="2">
-                <a:schemeClr val="accent1"/>
-              </a:effectRef>
-              <a:fontRef idx="minor">
-                <a:schemeClr val="lt1"/>
-              </a:fontRef>
-            </p:style>
-            <p:txBody>
-              <a:bodyPr rtlCol="0" anchor="ctr"/>
-              <a:lstStyle/>
-              <a:p>
-                <a:pPr algn="ctr"/>
-                <a:endParaRPr lang="en-US"/>
-              </a:p>
-            </p:txBody>
-          </p:sp>
-        </p:grpSp>
-        <p:sp>
-          <p:nvSpPr>
-            <p:cNvPr id="59" name="Right Triangle 58"/>
-            <p:cNvSpPr/>
-            <p:nvPr/>
-          </p:nvSpPr>
-          <p:spPr>
-            <a:xfrm flipV="1">
-              <a:off x="6480173" y="4958153"/>
-              <a:ext cx="172985" cy="172985"/>
-            </a:xfrm>
-            <a:prstGeom prst="rtTriangle">
-              <a:avLst/>
-            </a:prstGeom>
+            <a:off x="1205987" y="4451846"/>
+            <a:ext cx="114935" cy="125813"/>
+          </a:xfrm>
+          <a:prstGeom prst="ellipse">
+            <a:avLst/>
+          </a:prstGeom>
+          <a:solidFill>
+            <a:srgbClr val="E44B29"/>
+          </a:solidFill>
+          <a:ln>
             <a:solidFill>
-              <a:srgbClr val="7969A7"/>
+              <a:schemeClr val="tx1"/>
             </a:solidFill>
-            <a:ln>
-              <a:solidFill>
-                <a:schemeClr val="tx1"/>
-              </a:solidFill>
-            </a:ln>
-          </p:spPr>
-          <p:style>
-            <a:lnRef idx="1">
-              <a:schemeClr val="accent1"/>
-            </a:lnRef>
-            <a:fillRef idx="3">
-              <a:schemeClr val="accent1"/>
-            </a:fillRef>
-            <a:effectRef idx="2">
-              <a:schemeClr val="accent1"/>
-            </a:effectRef>
-            <a:fontRef idx="minor">
-              <a:schemeClr val="lt1"/>
-            </a:fontRef>
-          </p:style>
-          <p:txBody>
-            <a:bodyPr rtlCol="0" anchor="ctr"/>
-            <a:lstStyle/>
-            <a:p>
-              <a:pPr algn="ctr"/>
-              <a:endParaRPr lang="en-US"/>
-            </a:p>
-          </p:txBody>
-        </p:sp>
-      </p:grpSp>
+          </a:ln>
+        </p:spPr>
+        <p:style>
+          <a:lnRef idx="1">
+            <a:schemeClr val="accent1"/>
+          </a:lnRef>
+          <a:fillRef idx="3">
+            <a:schemeClr val="accent1"/>
+          </a:fillRef>
+          <a:effectRef idx="2">
+            <a:schemeClr val="accent1"/>
+          </a:effectRef>
+          <a:fontRef idx="minor">
+            <a:schemeClr val="lt1"/>
+          </a:fontRef>
+        </p:style>
+        <p:txBody>
+          <a:bodyPr rtlCol="0" anchor="ctr"/>
+          <a:lstStyle/>
+          <a:p>
+            <a:pPr algn="ctr"/>
+            <a:endParaRPr lang="en-US"/>
+          </a:p>
+        </p:txBody>
+      </p:sp>
+      <p:sp>
+        <p:nvSpPr>
+          <p:cNvPr id="36" name="Rectangle 35"/>
+          <p:cNvSpPr/>
+          <p:nvPr/>
+        </p:nvSpPr>
+        <p:spPr>
+          <a:xfrm rot="18900000">
+            <a:off x="2023604" y="4444880"/>
+            <a:ext cx="114935" cy="120650"/>
+          </a:xfrm>
+          <a:prstGeom prst="rect">
+            <a:avLst/>
+          </a:prstGeom>
+          <a:solidFill>
+            <a:srgbClr val="7DA426"/>
+          </a:solidFill>
+          <a:ln>
+            <a:solidFill>
+              <a:srgbClr val="000000"/>
+            </a:solidFill>
+          </a:ln>
+        </p:spPr>
+        <p:style>
+          <a:lnRef idx="1">
+            <a:schemeClr val="accent1"/>
+          </a:lnRef>
+          <a:fillRef idx="3">
+            <a:schemeClr val="accent1"/>
+          </a:fillRef>
+          <a:effectRef idx="2">
+            <a:schemeClr val="accent1"/>
+          </a:effectRef>
+          <a:fontRef idx="minor">
+            <a:schemeClr val="lt1"/>
+          </a:fontRef>
+        </p:style>
+        <p:txBody>
+          <a:bodyPr rtlCol="0" anchor="ctr"/>
+          <a:lstStyle/>
+          <a:p>
+            <a:pPr algn="ctr"/>
+            <a:endParaRPr lang="en-US"/>
+          </a:p>
+        </p:txBody>
+      </p:sp>
+      <p:sp>
+        <p:nvSpPr>
+          <p:cNvPr id="34" name="Rectangle 33"/>
+          <p:cNvSpPr/>
+          <p:nvPr/>
+        </p:nvSpPr>
+        <p:spPr>
+          <a:xfrm>
+            <a:off x="3669179" y="4447135"/>
+            <a:ext cx="114935" cy="120650"/>
+          </a:xfrm>
+          <a:prstGeom prst="rect">
+            <a:avLst/>
+          </a:prstGeom>
+          <a:solidFill>
+            <a:srgbClr val="4A69A1"/>
+          </a:solidFill>
+          <a:ln>
+            <a:solidFill>
+              <a:srgbClr val="000000"/>
+            </a:solidFill>
+          </a:ln>
+        </p:spPr>
+        <p:style>
+          <a:lnRef idx="1">
+            <a:schemeClr val="accent1"/>
+          </a:lnRef>
+          <a:fillRef idx="3">
+            <a:schemeClr val="accent1"/>
+          </a:fillRef>
+          <a:effectRef idx="2">
+            <a:schemeClr val="accent1"/>
+          </a:effectRef>
+          <a:fontRef idx="minor">
+            <a:schemeClr val="lt1"/>
+          </a:fontRef>
+        </p:style>
+        <p:txBody>
+          <a:bodyPr rtlCol="0" anchor="ctr"/>
+          <a:lstStyle/>
+          <a:p>
+            <a:pPr algn="ctr"/>
+            <a:endParaRPr lang="en-US"/>
+          </a:p>
+        </p:txBody>
+      </p:sp>
+      <p:sp>
+        <p:nvSpPr>
+          <p:cNvPr id="35" name="Isosceles Triangle 34"/>
+          <p:cNvSpPr/>
+          <p:nvPr/>
+        </p:nvSpPr>
+        <p:spPr>
+          <a:xfrm>
+            <a:off x="2852237" y="4203155"/>
+            <a:ext cx="114935" cy="139700"/>
+          </a:xfrm>
+          <a:prstGeom prst="triangle">
+            <a:avLst/>
+          </a:prstGeom>
+          <a:solidFill>
+            <a:srgbClr val="CE851C"/>
+          </a:solidFill>
+          <a:ln>
+            <a:solidFill>
+              <a:srgbClr val="000000"/>
+            </a:solidFill>
+          </a:ln>
+        </p:spPr>
+        <p:style>
+          <a:lnRef idx="1">
+            <a:schemeClr val="accent1"/>
+          </a:lnRef>
+          <a:fillRef idx="3">
+            <a:schemeClr val="accent1"/>
+          </a:fillRef>
+          <a:effectRef idx="2">
+            <a:schemeClr val="accent1"/>
+          </a:effectRef>
+          <a:fontRef idx="minor">
+            <a:schemeClr val="lt1"/>
+          </a:fontRef>
+        </p:style>
+        <p:txBody>
+          <a:bodyPr rtlCol="0" anchor="ctr"/>
+          <a:lstStyle/>
+          <a:p>
+            <a:pPr algn="ctr"/>
+            <a:endParaRPr lang="en-US"/>
+          </a:p>
+        </p:txBody>
+      </p:sp>
+      <p:sp>
+        <p:nvSpPr>
+          <p:cNvPr id="59" name="Right Triangle 58"/>
+          <p:cNvSpPr/>
+          <p:nvPr/>
+        </p:nvSpPr>
+        <p:spPr>
+          <a:xfrm flipV="1">
+            <a:off x="6480173" y="4958153"/>
+            <a:ext cx="172985" cy="172985"/>
+          </a:xfrm>
+          <a:prstGeom prst="rtTriangle">
+            <a:avLst/>
+          </a:prstGeom>
+          <a:solidFill>
+            <a:srgbClr val="7969A7"/>
+          </a:solidFill>
+          <a:ln>
+            <a:solidFill>
+              <a:schemeClr val="tx1"/>
+            </a:solidFill>
+          </a:ln>
+        </p:spPr>
+        <p:style>
+          <a:lnRef idx="1">
+            <a:schemeClr val="accent1"/>
+          </a:lnRef>
+          <a:fillRef idx="3">
+            <a:schemeClr val="accent1"/>
+          </a:fillRef>
+          <a:effectRef idx="2">
+            <a:schemeClr val="accent1"/>
+          </a:effectRef>
+          <a:fontRef idx="minor">
+            <a:schemeClr val="lt1"/>
+          </a:fontRef>
+        </p:style>
+        <p:txBody>
+          <a:bodyPr rtlCol="0" anchor="ctr"/>
+          <a:lstStyle/>
+          <a:p>
+            <a:pPr algn="ctr"/>
+            <a:endParaRPr lang="en-US"/>
+          </a:p>
+        </p:txBody>
+      </p:sp>
     </p:spTree>
     <p:extLst>
       <p:ext uri="{BB962C8B-B14F-4D97-AF65-F5344CB8AC3E}">

</xml_diff>

<commit_message>
added description of Shiva's code
</commit_message>
<xml_diff>
--- a/RA-L/pictures/pdf/ControlledCorrelation.pptx
+++ b/RA-L/pictures/pdf/ControlledCorrelation.pptx
@@ -7,7 +7,7 @@
   <p:sldIdLst>
     <p:sldId id="256" r:id="rId2"/>
   </p:sldIdLst>
-  <p:sldSz cx="9144000" cy="6858000" type="screen4x3"/>
+  <p:sldSz cx="9144000" cy="6492875"/>
   <p:notesSz cx="6858000" cy="9144000"/>
   <p:defaultTextStyle>
     <a:defPPr>
@@ -136,8 +136,8 @@
         </p:nvSpPr>
         <p:spPr>
           <a:xfrm>
-            <a:off x="685800" y="2130425"/>
-            <a:ext cx="7772400" cy="1470025"/>
+            <a:off x="685800" y="2017001"/>
+            <a:ext cx="7772400" cy="1391759"/>
           </a:xfrm>
         </p:spPr>
         <p:txBody>
@@ -164,8 +164,8 @@
         </p:nvSpPr>
         <p:spPr>
           <a:xfrm>
-            <a:off x="1371600" y="3886200"/>
-            <a:ext cx="6400800" cy="1752600"/>
+            <a:off x="1371600" y="3679296"/>
+            <a:ext cx="6400800" cy="1659290"/>
           </a:xfrm>
         </p:spPr>
         <p:txBody>
@@ -288,7 +288,7 @@
           <a:p>
             <a:fld id="{FC441788-6DDF-174F-80D5-0EC3A19C3AB8}" type="datetimeFigureOut">
               <a:rPr lang="en-US" smtClean="0"/>
-              <a:t>12/7/16</a:t>
+              <a:t>12/9/16</a:t>
             </a:fld>
             <a:endParaRPr lang="en-US"/>
           </a:p>
@@ -458,7 +458,7 @@
           <a:p>
             <a:fld id="{FC441788-6DDF-174F-80D5-0EC3A19C3AB8}" type="datetimeFigureOut">
               <a:rPr lang="en-US" smtClean="0"/>
-              <a:t>12/7/16</a:t>
+              <a:t>12/9/16</a:t>
             </a:fld>
             <a:endParaRPr lang="en-US"/>
           </a:p>
@@ -548,8 +548,8 @@
         </p:nvSpPr>
         <p:spPr>
           <a:xfrm>
-            <a:off x="6629400" y="274638"/>
-            <a:ext cx="2057400" cy="5851525"/>
+            <a:off x="6629400" y="260017"/>
+            <a:ext cx="2057400" cy="5539985"/>
           </a:xfrm>
         </p:spPr>
         <p:txBody>
@@ -576,8 +576,8 @@
         </p:nvSpPr>
         <p:spPr>
           <a:xfrm>
-            <a:off x="457200" y="274638"/>
-            <a:ext cx="6019800" cy="5851525"/>
+            <a:off x="457200" y="260017"/>
+            <a:ext cx="6019800" cy="5539985"/>
           </a:xfrm>
         </p:spPr>
         <p:txBody>
@@ -638,7 +638,7 @@
           <a:p>
             <a:fld id="{FC441788-6DDF-174F-80D5-0EC3A19C3AB8}" type="datetimeFigureOut">
               <a:rPr lang="en-US" smtClean="0"/>
-              <a:t>12/7/16</a:t>
+              <a:t>12/9/16</a:t>
             </a:fld>
             <a:endParaRPr lang="en-US"/>
           </a:p>
@@ -808,7 +808,7 @@
           <a:p>
             <a:fld id="{FC441788-6DDF-174F-80D5-0EC3A19C3AB8}" type="datetimeFigureOut">
               <a:rPr lang="en-US" smtClean="0"/>
-              <a:t>12/7/16</a:t>
+              <a:t>12/9/16</a:t>
             </a:fld>
             <a:endParaRPr lang="en-US"/>
           </a:p>
@@ -898,8 +898,8 @@
         </p:nvSpPr>
         <p:spPr>
           <a:xfrm>
-            <a:off x="722313" y="4406900"/>
-            <a:ext cx="7772400" cy="1362075"/>
+            <a:off x="722313" y="4172274"/>
+            <a:ext cx="7772400" cy="1289557"/>
           </a:xfrm>
         </p:spPr>
         <p:txBody>
@@ -930,8 +930,8 @@
         </p:nvSpPr>
         <p:spPr>
           <a:xfrm>
-            <a:off x="722313" y="2906713"/>
-            <a:ext cx="7772400" cy="1500187"/>
+            <a:off x="722313" y="2751958"/>
+            <a:ext cx="7772400" cy="1420316"/>
           </a:xfrm>
         </p:spPr>
         <p:txBody>
@@ -1054,7 +1054,7 @@
           <a:p>
             <a:fld id="{FC441788-6DDF-174F-80D5-0EC3A19C3AB8}" type="datetimeFigureOut">
               <a:rPr lang="en-US" smtClean="0"/>
-              <a:t>12/7/16</a:t>
+              <a:t>12/9/16</a:t>
             </a:fld>
             <a:endParaRPr lang="en-US"/>
           </a:p>
@@ -1167,8 +1167,8 @@
         </p:nvSpPr>
         <p:spPr>
           <a:xfrm>
-            <a:off x="457200" y="1600200"/>
-            <a:ext cx="4038600" cy="4525963"/>
+            <a:off x="457200" y="1515005"/>
+            <a:ext cx="4038600" cy="4284997"/>
           </a:xfrm>
         </p:spPr>
         <p:txBody>
@@ -1252,8 +1252,8 @@
         </p:nvSpPr>
         <p:spPr>
           <a:xfrm>
-            <a:off x="4648200" y="1600200"/>
-            <a:ext cx="4038600" cy="4525963"/>
+            <a:off x="4648200" y="1515005"/>
+            <a:ext cx="4038600" cy="4284997"/>
           </a:xfrm>
         </p:spPr>
         <p:txBody>
@@ -1342,7 +1342,7 @@
           <a:p>
             <a:fld id="{FC441788-6DDF-174F-80D5-0EC3A19C3AB8}" type="datetimeFigureOut">
               <a:rPr lang="en-US" smtClean="0"/>
-              <a:t>12/7/16</a:t>
+              <a:t>12/9/16</a:t>
             </a:fld>
             <a:endParaRPr lang="en-US"/>
           </a:p>
@@ -1459,8 +1459,8 @@
         </p:nvSpPr>
         <p:spPr>
           <a:xfrm>
-            <a:off x="457200" y="1535113"/>
-            <a:ext cx="4040188" cy="639762"/>
+            <a:off x="457200" y="1453383"/>
+            <a:ext cx="4040188" cy="605700"/>
           </a:xfrm>
         </p:spPr>
         <p:txBody>
@@ -1524,8 +1524,8 @@
         </p:nvSpPr>
         <p:spPr>
           <a:xfrm>
-            <a:off x="457200" y="2174875"/>
-            <a:ext cx="4040188" cy="3951288"/>
+            <a:off x="457200" y="2059083"/>
+            <a:ext cx="4040188" cy="3740919"/>
           </a:xfrm>
         </p:spPr>
         <p:txBody>
@@ -1609,8 +1609,8 @@
         </p:nvSpPr>
         <p:spPr>
           <a:xfrm>
-            <a:off x="4645025" y="1535113"/>
-            <a:ext cx="4041775" cy="639762"/>
+            <a:off x="4645027" y="1453383"/>
+            <a:ext cx="4041775" cy="605700"/>
           </a:xfrm>
         </p:spPr>
         <p:txBody>
@@ -1674,8 +1674,8 @@
         </p:nvSpPr>
         <p:spPr>
           <a:xfrm>
-            <a:off x="4645025" y="2174875"/>
-            <a:ext cx="4041775" cy="3951288"/>
+            <a:off x="4645027" y="2059083"/>
+            <a:ext cx="4041775" cy="3740919"/>
           </a:xfrm>
         </p:spPr>
         <p:txBody>
@@ -1764,7 +1764,7 @@
           <a:p>
             <a:fld id="{FC441788-6DDF-174F-80D5-0EC3A19C3AB8}" type="datetimeFigureOut">
               <a:rPr lang="en-US" smtClean="0"/>
-              <a:t>12/7/16</a:t>
+              <a:t>12/9/16</a:t>
             </a:fld>
             <a:endParaRPr lang="en-US"/>
           </a:p>
@@ -1882,7 +1882,7 @@
           <a:p>
             <a:fld id="{FC441788-6DDF-174F-80D5-0EC3A19C3AB8}" type="datetimeFigureOut">
               <a:rPr lang="en-US" smtClean="0"/>
-              <a:t>12/7/16</a:t>
+              <a:t>12/9/16</a:t>
             </a:fld>
             <a:endParaRPr lang="en-US"/>
           </a:p>
@@ -1977,7 +1977,7 @@
           <a:p>
             <a:fld id="{FC441788-6DDF-174F-80D5-0EC3A19C3AB8}" type="datetimeFigureOut">
               <a:rPr lang="en-US" smtClean="0"/>
-              <a:t>12/7/16</a:t>
+              <a:t>12/9/16</a:t>
             </a:fld>
             <a:endParaRPr lang="en-US"/>
           </a:p>
@@ -2067,8 +2067,8 @@
         </p:nvSpPr>
         <p:spPr>
           <a:xfrm>
-            <a:off x="457200" y="273050"/>
-            <a:ext cx="3008313" cy="1162050"/>
+            <a:off x="457202" y="258513"/>
+            <a:ext cx="3008313" cy="1100182"/>
           </a:xfrm>
         </p:spPr>
         <p:txBody>
@@ -2099,8 +2099,8 @@
         </p:nvSpPr>
         <p:spPr>
           <a:xfrm>
-            <a:off x="3575050" y="273050"/>
-            <a:ext cx="5111750" cy="5853113"/>
+            <a:off x="3575050" y="258514"/>
+            <a:ext cx="5111750" cy="5541488"/>
           </a:xfrm>
         </p:spPr>
         <p:txBody>
@@ -2184,8 +2184,8 @@
         </p:nvSpPr>
         <p:spPr>
           <a:xfrm>
-            <a:off x="457200" y="1435100"/>
-            <a:ext cx="3008313" cy="4691063"/>
+            <a:off x="457202" y="1358695"/>
+            <a:ext cx="3008313" cy="4441307"/>
           </a:xfrm>
         </p:spPr>
         <p:txBody>
@@ -2254,7 +2254,7 @@
           <a:p>
             <a:fld id="{FC441788-6DDF-174F-80D5-0EC3A19C3AB8}" type="datetimeFigureOut">
               <a:rPr lang="en-US" smtClean="0"/>
-              <a:t>12/7/16</a:t>
+              <a:t>12/9/16</a:t>
             </a:fld>
             <a:endParaRPr lang="en-US"/>
           </a:p>
@@ -2344,8 +2344,8 @@
         </p:nvSpPr>
         <p:spPr>
           <a:xfrm>
-            <a:off x="1792288" y="4800600"/>
-            <a:ext cx="5486400" cy="566738"/>
+            <a:off x="1792288" y="4545013"/>
+            <a:ext cx="5486400" cy="536564"/>
           </a:xfrm>
         </p:spPr>
         <p:txBody>
@@ -2376,8 +2376,8 @@
         </p:nvSpPr>
         <p:spPr>
           <a:xfrm>
-            <a:off x="1792288" y="612775"/>
-            <a:ext cx="5486400" cy="4114800"/>
+            <a:off x="1792288" y="580150"/>
+            <a:ext cx="5486400" cy="3895725"/>
           </a:xfrm>
         </p:spPr>
         <p:txBody>
@@ -2437,8 +2437,8 @@
         </p:nvSpPr>
         <p:spPr>
           <a:xfrm>
-            <a:off x="1792288" y="5367338"/>
-            <a:ext cx="5486400" cy="804862"/>
+            <a:off x="1792288" y="5081577"/>
+            <a:ext cx="5486400" cy="762011"/>
           </a:xfrm>
         </p:spPr>
         <p:txBody>
@@ -2507,7 +2507,7 @@
           <a:p>
             <a:fld id="{FC441788-6DDF-174F-80D5-0EC3A19C3AB8}" type="datetimeFigureOut">
               <a:rPr lang="en-US" smtClean="0"/>
-              <a:t>12/7/16</a:t>
+              <a:t>12/9/16</a:t>
             </a:fld>
             <a:endParaRPr lang="en-US"/>
           </a:p>
@@ -2602,8 +2602,8 @@
         </p:nvSpPr>
         <p:spPr>
           <a:xfrm>
-            <a:off x="457200" y="274638"/>
-            <a:ext cx="8229600" cy="1143000"/>
+            <a:off x="457200" y="260016"/>
+            <a:ext cx="8229600" cy="1082146"/>
           </a:xfrm>
           <a:prstGeom prst="rect">
             <a:avLst/>
@@ -2635,8 +2635,8 @@
         </p:nvSpPr>
         <p:spPr>
           <a:xfrm>
-            <a:off x="457200" y="1600200"/>
-            <a:ext cx="8229600" cy="4525963"/>
+            <a:off x="457200" y="1515005"/>
+            <a:ext cx="8229600" cy="4284997"/>
           </a:xfrm>
           <a:prstGeom prst="rect">
             <a:avLst/>
@@ -2697,8 +2697,8 @@
         </p:nvSpPr>
         <p:spPr>
           <a:xfrm>
-            <a:off x="457200" y="6356350"/>
-            <a:ext cx="2133600" cy="365125"/>
+            <a:off x="457200" y="6017934"/>
+            <a:ext cx="2133600" cy="345685"/>
           </a:xfrm>
           <a:prstGeom prst="rect">
             <a:avLst/>
@@ -2720,7 +2720,7 @@
           <a:p>
             <a:fld id="{FC441788-6DDF-174F-80D5-0EC3A19C3AB8}" type="datetimeFigureOut">
               <a:rPr lang="en-US" smtClean="0"/>
-              <a:t>12/7/16</a:t>
+              <a:t>12/9/16</a:t>
             </a:fld>
             <a:endParaRPr lang="en-US"/>
           </a:p>
@@ -2738,8 +2738,8 @@
         </p:nvSpPr>
         <p:spPr>
           <a:xfrm>
-            <a:off x="3124200" y="6356350"/>
-            <a:ext cx="2895600" cy="365125"/>
+            <a:off x="3124200" y="6017934"/>
+            <a:ext cx="2895600" cy="345685"/>
           </a:xfrm>
           <a:prstGeom prst="rect">
             <a:avLst/>
@@ -2775,8 +2775,8 @@
         </p:nvSpPr>
         <p:spPr>
           <a:xfrm>
-            <a:off x="6553200" y="6356350"/>
-            <a:ext cx="2133600" cy="365125"/>
+            <a:off x="6553200" y="6017934"/>
+            <a:ext cx="2133600" cy="345685"/>
           </a:xfrm>
           <a:prstGeom prst="rect">
             <a:avLst/>
@@ -3097,7 +3097,7 @@
       </p:grpSpPr>
       <p:pic>
         <p:nvPicPr>
-          <p:cNvPr id="18" name="Picture 17"/>
+          <p:cNvPr id="66" name="Picture 65"/>
           <p:cNvPicPr>
             <a:picLocks noChangeAspect="1"/>
           </p:cNvPicPr>
@@ -3120,7 +3120,7 @@
       </p:pic>
       <p:pic>
         <p:nvPicPr>
-          <p:cNvPr id="61" name="Picture 60"/>
+          <p:cNvPr id="67" name="Picture 66"/>
           <p:cNvPicPr>
             <a:picLocks noChangeAspect="1"/>
           </p:cNvPicPr>
@@ -3144,7 +3144,7 @@
       </p:pic>
       <p:pic>
         <p:nvPicPr>
-          <p:cNvPr id="3" name="Picture 2"/>
+          <p:cNvPr id="68" name="Picture 67"/>
           <p:cNvPicPr>
             <a:picLocks noChangeAspect="1"/>
           </p:cNvPicPr>
@@ -3168,7 +3168,7 @@
       </p:pic>
       <p:pic>
         <p:nvPicPr>
-          <p:cNvPr id="15" name="Picture 14"/>
+          <p:cNvPr id="69" name="Picture 68"/>
           <p:cNvPicPr>
             <a:picLocks noChangeAspect="1"/>
           </p:cNvPicPr>
@@ -3191,7 +3191,7 @@
       </p:pic>
       <p:pic>
         <p:nvPicPr>
-          <p:cNvPr id="16" name="Picture 15"/>
+          <p:cNvPr id="70" name="Picture 69"/>
           <p:cNvPicPr>
             <a:picLocks noChangeAspect="1"/>
           </p:cNvPicPr>
@@ -3214,7 +3214,7 @@
       </p:pic>
       <p:pic>
         <p:nvPicPr>
-          <p:cNvPr id="17" name="Picture 16"/>
+          <p:cNvPr id="71" name="Picture 70"/>
           <p:cNvPicPr>
             <a:picLocks noChangeAspect="1"/>
           </p:cNvPicPr>
@@ -3237,7 +3237,7 @@
       </p:pic>
       <p:sp>
         <p:nvSpPr>
-          <p:cNvPr id="30" name="Oval 29"/>
+          <p:cNvPr id="72" name="Oval 71"/>
           <p:cNvSpPr/>
           <p:nvPr/>
         </p:nvSpPr>
@@ -3283,7 +3283,7 @@
       </p:sp>
       <p:sp>
         <p:nvSpPr>
-          <p:cNvPr id="31" name="Isosceles Triangle 30"/>
+          <p:cNvPr id="73" name="Isosceles Triangle 72"/>
           <p:cNvSpPr/>
           <p:nvPr/>
         </p:nvSpPr>
@@ -3329,7 +3329,7 @@
       </p:sp>
       <p:sp>
         <p:nvSpPr>
-          <p:cNvPr id="32" name="Rectangle 31"/>
+          <p:cNvPr id="74" name="Rectangle 73"/>
           <p:cNvSpPr/>
           <p:nvPr/>
         </p:nvSpPr>
@@ -3375,7 +3375,7 @@
       </p:sp>
       <p:sp>
         <p:nvSpPr>
-          <p:cNvPr id="33" name="Rectangle 32"/>
+          <p:cNvPr id="75" name="Rectangle 74"/>
           <p:cNvSpPr/>
           <p:nvPr/>
         </p:nvSpPr>
@@ -3421,7 +3421,7 @@
       </p:sp>
       <p:cxnSp>
         <p:nvCxnSpPr>
-          <p:cNvPr id="39" name="Straight Arrow Connector 38"/>
+          <p:cNvPr id="76" name="Straight Arrow Connector 75"/>
           <p:cNvCxnSpPr/>
           <p:nvPr/>
         </p:nvCxnSpPr>
@@ -3458,7 +3458,7 @@
       </p:cxnSp>
       <p:cxnSp>
         <p:nvCxnSpPr>
-          <p:cNvPr id="41" name="Straight Arrow Connector 40"/>
+          <p:cNvPr id="77" name="Straight Arrow Connector 76"/>
           <p:cNvCxnSpPr/>
           <p:nvPr/>
         </p:nvCxnSpPr>
@@ -3495,7 +3495,7 @@
       </p:cxnSp>
       <p:cxnSp>
         <p:nvCxnSpPr>
-          <p:cNvPr id="44" name="Straight Arrow Connector 43"/>
+          <p:cNvPr id="78" name="Straight Arrow Connector 77"/>
           <p:cNvCxnSpPr/>
           <p:nvPr/>
         </p:nvCxnSpPr>
@@ -3532,7 +3532,7 @@
       </p:cxnSp>
       <p:sp>
         <p:nvSpPr>
-          <p:cNvPr id="50" name="TextBox 49"/>
+          <p:cNvPr id="79" name="TextBox 78"/>
           <p:cNvSpPr txBox="1"/>
           <p:nvPr/>
         </p:nvSpPr>
@@ -3568,7 +3568,7 @@
       </p:sp>
       <p:sp>
         <p:nvSpPr>
-          <p:cNvPr id="51" name="TextBox 50"/>
+          <p:cNvPr id="80" name="TextBox 79"/>
           <p:cNvSpPr txBox="1"/>
           <p:nvPr/>
         </p:nvSpPr>
@@ -3604,7 +3604,7 @@
       </p:sp>
       <p:sp>
         <p:nvSpPr>
-          <p:cNvPr id="52" name="TextBox 51"/>
+          <p:cNvPr id="81" name="TextBox 80"/>
           <p:cNvSpPr txBox="1"/>
           <p:nvPr/>
         </p:nvSpPr>
@@ -3640,7 +3640,7 @@
       </p:sp>
       <p:sp>
         <p:nvSpPr>
-          <p:cNvPr id="53" name="TextBox 52"/>
+          <p:cNvPr id="82" name="TextBox 81"/>
           <p:cNvSpPr txBox="1"/>
           <p:nvPr/>
         </p:nvSpPr>
@@ -3676,7 +3676,7 @@
       </p:sp>
       <p:sp>
         <p:nvSpPr>
-          <p:cNvPr id="57" name="Right Triangle 56"/>
+          <p:cNvPr id="83" name="Right Triangle 82"/>
           <p:cNvSpPr/>
           <p:nvPr/>
         </p:nvSpPr>
@@ -3722,7 +3722,7 @@
       </p:sp>
       <p:sp>
         <p:nvSpPr>
-          <p:cNvPr id="25" name="Oval 24"/>
+          <p:cNvPr id="84" name="Oval 83"/>
           <p:cNvSpPr/>
           <p:nvPr/>
         </p:nvSpPr>
@@ -3768,7 +3768,7 @@
       </p:sp>
       <p:sp>
         <p:nvSpPr>
-          <p:cNvPr id="36" name="Rectangle 35"/>
+          <p:cNvPr id="85" name="Rectangle 84"/>
           <p:cNvSpPr/>
           <p:nvPr/>
         </p:nvSpPr>
@@ -3814,7 +3814,7 @@
       </p:sp>
       <p:sp>
         <p:nvSpPr>
-          <p:cNvPr id="34" name="Rectangle 33"/>
+          <p:cNvPr id="86" name="Rectangle 85"/>
           <p:cNvSpPr/>
           <p:nvPr/>
         </p:nvSpPr>
@@ -3860,7 +3860,7 @@
       </p:sp>
       <p:sp>
         <p:nvSpPr>
-          <p:cNvPr id="35" name="Isosceles Triangle 34"/>
+          <p:cNvPr id="87" name="Isosceles Triangle 86"/>
           <p:cNvSpPr/>
           <p:nvPr/>
         </p:nvSpPr>
@@ -3906,7 +3906,7 @@
       </p:sp>
       <p:sp>
         <p:nvSpPr>
-          <p:cNvPr id="59" name="Right Triangle 58"/>
+          <p:cNvPr id="88" name="Right Triangle 87"/>
           <p:cNvSpPr/>
           <p:nvPr/>
         </p:nvSpPr>

</xml_diff>